<commit_message>
modify data flow diagram
</commit_message>
<xml_diff>
--- a/Milestone#2 Reportouts/Milestone 2 report (WIP).pptx
+++ b/Milestone#2 Reportouts/Milestone 2 report (WIP).pptx
@@ -285,7 +285,7 @@
       </p15:sldGuideLst>
     </p:ext>
     <p:ext uri="http://customooxmlschemas.google.com/">
-      <go:slidesCustomData xmlns="" xmlns:mc="http://schemas.openxmlformats.org/markup-compatibility/2006" xmlns:mv="urn:schemas-microsoft-com:mac:vml" xmlns:c="http://schemas.openxmlformats.org/drawingml/2006/chart" xmlns:dgm="http://schemas.openxmlformats.org/drawingml/2006/diagram" xmlns:o="urn:schemas-microsoft-com:office:office" xmlns:v="urn:schemas-microsoft-com:vml" xmlns:pvml="urn:schemas-microsoft-com:office:powerpoint" xmlns:com="http://schemas.openxmlformats.org/drawingml/2006/compatibility" xmlns:p14="http://schemas.microsoft.com/office/powerpoint/2010/main" xmlns:p15="http://schemas.microsoft.com/office/powerpoint/2012/main" xmlns:go="http://customooxmlschemas.google.com/" r:id="rId27" roundtripDataSignature="AMtx7mja3f1JpJgllVqZbMpLizDtayQKsQ=="/>
+      <go:slidesCustomData xmlns:go="http://customooxmlschemas.google.com/" xmlns:p15="http://schemas.microsoft.com/office/powerpoint/2012/main" xmlns:p14="http://schemas.microsoft.com/office/powerpoint/2010/main" xmlns:com="http://schemas.openxmlformats.org/drawingml/2006/compatibility" xmlns:pvml="urn:schemas-microsoft-com:office:powerpoint" xmlns:v="urn:schemas-microsoft-com:vml" xmlns:o="urn:schemas-microsoft-com:office:office" xmlns:dgm="http://schemas.openxmlformats.org/drawingml/2006/diagram" xmlns:c="http://schemas.openxmlformats.org/drawingml/2006/chart" xmlns:mv="urn:schemas-microsoft-com:mac:vml" xmlns:mc="http://schemas.openxmlformats.org/markup-compatibility/2006" xmlns="" r:id="rId27" roundtripDataSignature="AMtx7mja3f1JpJgllVqZbMpLizDtayQKsQ=="/>
     </p:ext>
   </p:extLst>
 </p:presentation>
@@ -16256,7 +16256,7 @@
         </p:nvSpPr>
         <p:spPr>
           <a:xfrm>
-            <a:off x="4638859" y="1169517"/>
+            <a:off x="4638859" y="1201321"/>
             <a:ext cx="562975" cy="307777"/>
           </a:xfrm>
           <a:prstGeom prst="rect">
@@ -16524,7 +16524,7 @@
         </p:nvSpPr>
         <p:spPr>
           <a:xfrm>
-            <a:off x="4248322" y="2693644"/>
+            <a:off x="4248322" y="2677742"/>
             <a:ext cx="1399742" cy="523220"/>
           </a:xfrm>
           <a:prstGeom prst="rect">
@@ -16818,7 +16818,7 @@
         </p:nvSpPr>
         <p:spPr>
           <a:xfrm>
-            <a:off x="4583521" y="4348517"/>
+            <a:off x="4583521" y="4213345"/>
             <a:ext cx="872355" cy="307777"/>
           </a:xfrm>
           <a:prstGeom prst="rect">
@@ -16958,8 +16958,8 @@
         </p:nvCxnSpPr>
         <p:spPr>
           <a:xfrm flipV="1">
-            <a:off x="4947140" y="3216864"/>
-            <a:ext cx="1053" cy="864771"/>
+            <a:off x="4947140" y="3200962"/>
+            <a:ext cx="1053" cy="880673"/>
           </a:xfrm>
           <a:prstGeom prst="straightConnector1">
             <a:avLst/>

</xml_diff>